<commit_message>
solved figs, table and module
</commit_message>
<xml_diff>
--- a/figures/ModuleWavenet.pptx
+++ b/figures/ModuleWavenet.pptx
@@ -199,7 +199,7 @@
           <a:p>
             <a:fld id="{8DA6EE67-C59E-F84B-AEA2-5C5587E50374}" type="datetimeFigureOut">
               <a:rPr lang="es-NL" smtClean="0"/>
-              <a:t>07-07-2024</a:t>
+              <a:t>08-07-2024</a:t>
             </a:fld>
             <a:endParaRPr lang="es-NL"/>
           </a:p>
@@ -700,7 +700,7 @@
           <a:p>
             <a:fld id="{290CD9FD-56AE-451A-AF89-2ACD237B8955}" type="datetimeFigureOut">
               <a:rPr lang="en-GB" smtClean="0"/>
-              <a:t>07/07/2024</a:t>
+              <a:t>08/07/2024</a:t>
             </a:fld>
             <a:endParaRPr lang="en-GB"/>
           </a:p>
@@ -900,7 +900,7 @@
           <a:p>
             <a:fld id="{290CD9FD-56AE-451A-AF89-2ACD237B8955}" type="datetimeFigureOut">
               <a:rPr lang="en-GB" smtClean="0"/>
-              <a:t>07/07/2024</a:t>
+              <a:t>08/07/2024</a:t>
             </a:fld>
             <a:endParaRPr lang="en-GB"/>
           </a:p>
@@ -1110,7 +1110,7 @@
           <a:p>
             <a:fld id="{290CD9FD-56AE-451A-AF89-2ACD237B8955}" type="datetimeFigureOut">
               <a:rPr lang="en-GB" smtClean="0"/>
-              <a:t>07/07/2024</a:t>
+              <a:t>08/07/2024</a:t>
             </a:fld>
             <a:endParaRPr lang="en-GB"/>
           </a:p>
@@ -1310,7 +1310,7 @@
           <a:p>
             <a:fld id="{290CD9FD-56AE-451A-AF89-2ACD237B8955}" type="datetimeFigureOut">
               <a:rPr lang="en-GB" smtClean="0"/>
-              <a:t>07/07/2024</a:t>
+              <a:t>08/07/2024</a:t>
             </a:fld>
             <a:endParaRPr lang="en-GB"/>
           </a:p>
@@ -1586,7 +1586,7 @@
           <a:p>
             <a:fld id="{290CD9FD-56AE-451A-AF89-2ACD237B8955}" type="datetimeFigureOut">
               <a:rPr lang="en-GB" smtClean="0"/>
-              <a:t>07/07/2024</a:t>
+              <a:t>08/07/2024</a:t>
             </a:fld>
             <a:endParaRPr lang="en-GB"/>
           </a:p>
@@ -1854,7 +1854,7 @@
           <a:p>
             <a:fld id="{290CD9FD-56AE-451A-AF89-2ACD237B8955}" type="datetimeFigureOut">
               <a:rPr lang="en-GB" smtClean="0"/>
-              <a:t>07/07/2024</a:t>
+              <a:t>08/07/2024</a:t>
             </a:fld>
             <a:endParaRPr lang="en-GB"/>
           </a:p>
@@ -2269,7 +2269,7 @@
           <a:p>
             <a:fld id="{290CD9FD-56AE-451A-AF89-2ACD237B8955}" type="datetimeFigureOut">
               <a:rPr lang="en-GB" smtClean="0"/>
-              <a:t>07/07/2024</a:t>
+              <a:t>08/07/2024</a:t>
             </a:fld>
             <a:endParaRPr lang="en-GB"/>
           </a:p>
@@ -2411,7 +2411,7 @@
           <a:p>
             <a:fld id="{290CD9FD-56AE-451A-AF89-2ACD237B8955}" type="datetimeFigureOut">
               <a:rPr lang="en-GB" smtClean="0"/>
-              <a:t>07/07/2024</a:t>
+              <a:t>08/07/2024</a:t>
             </a:fld>
             <a:endParaRPr lang="en-GB"/>
           </a:p>
@@ -2524,7 +2524,7 @@
           <a:p>
             <a:fld id="{290CD9FD-56AE-451A-AF89-2ACD237B8955}" type="datetimeFigureOut">
               <a:rPr lang="en-GB" smtClean="0"/>
-              <a:t>07/07/2024</a:t>
+              <a:t>08/07/2024</a:t>
             </a:fld>
             <a:endParaRPr lang="en-GB"/>
           </a:p>
@@ -2837,7 +2837,7 @@
           <a:p>
             <a:fld id="{290CD9FD-56AE-451A-AF89-2ACD237B8955}" type="datetimeFigureOut">
               <a:rPr lang="en-GB" smtClean="0"/>
-              <a:t>07/07/2024</a:t>
+              <a:t>08/07/2024</a:t>
             </a:fld>
             <a:endParaRPr lang="en-GB"/>
           </a:p>
@@ -3126,7 +3126,7 @@
           <a:p>
             <a:fld id="{290CD9FD-56AE-451A-AF89-2ACD237B8955}" type="datetimeFigureOut">
               <a:rPr lang="en-GB" smtClean="0"/>
-              <a:t>07/07/2024</a:t>
+              <a:t>08/07/2024</a:t>
             </a:fld>
             <a:endParaRPr lang="en-GB"/>
           </a:p>
@@ -3369,7 +3369,7 @@
           <a:p>
             <a:fld id="{290CD9FD-56AE-451A-AF89-2ACD237B8955}" type="datetimeFigureOut">
               <a:rPr lang="en-GB" smtClean="0"/>
-              <a:t>07/07/2024</a:t>
+              <a:t>08/07/2024</a:t>
             </a:fld>
             <a:endParaRPr lang="en-GB"/>
           </a:p>
@@ -6454,14 +6454,13 @@
           </p:cNvPr>
           <p:cNvCxnSpPr>
             <a:cxnSpLocks/>
-            <a:endCxn id="136" idx="3"/>
           </p:cNvCxnSpPr>
           <p:nvPr/>
         </p:nvCxnSpPr>
         <p:spPr>
           <a:xfrm flipV="1">
-            <a:off x="5178647" y="2833220"/>
-            <a:ext cx="4765635" cy="12518"/>
+            <a:off x="5178647" y="2838529"/>
+            <a:ext cx="4001929" cy="7209"/>
           </a:xfrm>
           <a:prstGeom prst="straightConnector1">
             <a:avLst/>
@@ -6485,8 +6484,8 @@
           </a:fontRef>
         </p:style>
       </p:cxnSp>
-      <mc:AlternateContent xmlns:mc="http://schemas.openxmlformats.org/markup-compatibility/2006">
-        <mc:Choice xmlns:a14="http://schemas.microsoft.com/office/drawing/2010/main" Requires="a14">
+      <mc:AlternateContent xmlns:mc="http://schemas.openxmlformats.org/markup-compatibility/2006" xmlns:a14="http://schemas.microsoft.com/office/drawing/2010/main">
+        <mc:Choice Requires="a14">
           <p:sp>
             <p:nvSpPr>
               <p:cNvPr id="113" name="CuadroTexto 112">
@@ -6566,7 +6565,7 @@
             </p:txBody>
           </p:sp>
         </mc:Choice>
-        <mc:Fallback>
+        <mc:Fallback xmlns="">
           <p:sp>
             <p:nvSpPr>
               <p:cNvPr id="113" name="CuadroTexto 112">
@@ -6670,8 +6669,8 @@
           </a:p>
         </p:txBody>
       </p:sp>
-      <mc:AlternateContent xmlns:mc="http://schemas.openxmlformats.org/markup-compatibility/2006">
-        <mc:Choice xmlns:a14="http://schemas.microsoft.com/office/drawing/2010/main" Requires="a14">
+      <mc:AlternateContent xmlns:mc="http://schemas.openxmlformats.org/markup-compatibility/2006" xmlns:a14="http://schemas.microsoft.com/office/drawing/2010/main">
+        <mc:Choice Requires="a14">
           <p:sp>
             <p:nvSpPr>
               <p:cNvPr id="12" name="CuadroTexto 11">
@@ -6687,7 +6686,7 @@
             <p:spPr>
               <a:xfrm>
                 <a:off x="2964789" y="4938462"/>
-                <a:ext cx="966611" cy="276999"/>
+                <a:ext cx="967957" cy="276999"/>
               </a:xfrm>
               <a:prstGeom prst="rect">
                 <a:avLst/>
@@ -6708,7 +6707,7 @@
                         <a:ea typeface="DEJAVU SANS" panose="020B0603030804020204" pitchFamily="34" charset="0"/>
                         <a:cs typeface="DEJAVU SANS" panose="020B0603030804020204" pitchFamily="34" charset="0"/>
                       </a:rPr>
-                      <m:t>𝑘</m:t>
+                      <m:t>𝑛</m:t>
                     </m:r>
                     <m:r>
                       <a:rPr lang="en-US" sz="1200" b="0" i="1" smtClean="0">
@@ -6732,7 +6731,7 @@
             </p:txBody>
           </p:sp>
         </mc:Choice>
-        <mc:Fallback>
+        <mc:Fallback xmlns="">
           <p:sp>
             <p:nvSpPr>
               <p:cNvPr id="12" name="CuadroTexto 11">
@@ -6750,7 +6749,7 @@
             <p:spPr>
               <a:xfrm>
                 <a:off x="2964789" y="4938462"/>
-                <a:ext cx="966611" cy="276999"/>
+                <a:ext cx="967957" cy="276999"/>
               </a:xfrm>
               <a:prstGeom prst="rect">
                 <a:avLst/>
@@ -6872,8 +6871,8 @@
           </a:p>
         </p:txBody>
       </p:sp>
-      <mc:AlternateContent xmlns:mc="http://schemas.openxmlformats.org/markup-compatibility/2006">
-        <mc:Choice xmlns:a14="http://schemas.microsoft.com/office/drawing/2010/main" Requires="a14">
+      <mc:AlternateContent xmlns:mc="http://schemas.openxmlformats.org/markup-compatibility/2006" xmlns:a14="http://schemas.microsoft.com/office/drawing/2010/main">
+        <mc:Choice Requires="a14">
           <p:sp>
             <p:nvSpPr>
               <p:cNvPr id="16" name="CuadroTexto 15">
@@ -6940,7 +6939,7 @@
             </p:txBody>
           </p:sp>
         </mc:Choice>
-        <mc:Fallback>
+        <mc:Fallback xmlns="">
           <p:sp>
             <p:nvSpPr>
               <p:cNvPr id="16" name="CuadroTexto 15">
@@ -7039,8 +7038,8 @@
           </a:p>
         </p:txBody>
       </p:sp>
-      <mc:AlternateContent xmlns:mc="http://schemas.openxmlformats.org/markup-compatibility/2006">
-        <mc:Choice xmlns:a14="http://schemas.microsoft.com/office/drawing/2010/main" Requires="a14">
+      <mc:AlternateContent xmlns:mc="http://schemas.openxmlformats.org/markup-compatibility/2006" xmlns:a14="http://schemas.microsoft.com/office/drawing/2010/main">
+        <mc:Choice Requires="a14">
           <p:sp>
             <p:nvSpPr>
               <p:cNvPr id="18" name="CuadroTexto 17">
@@ -7096,7 +7095,7 @@
             </p:txBody>
           </p:sp>
         </mc:Choice>
-        <mc:Fallback>
+        <mc:Fallback xmlns="">
           <p:sp>
             <p:nvSpPr>
               <p:cNvPr id="18" name="CuadroTexto 17">
@@ -7197,8 +7196,8 @@
           </a:p>
         </p:txBody>
       </p:sp>
-      <mc:AlternateContent xmlns:mc="http://schemas.openxmlformats.org/markup-compatibility/2006">
-        <mc:Choice xmlns:a14="http://schemas.microsoft.com/office/drawing/2010/main" Requires="a14">
+      <mc:AlternateContent xmlns:mc="http://schemas.openxmlformats.org/markup-compatibility/2006" xmlns:a14="http://schemas.microsoft.com/office/drawing/2010/main">
+        <mc:Choice Requires="a14">
           <p:sp>
             <p:nvSpPr>
               <p:cNvPr id="32" name="CuadroTexto 31">
@@ -7254,7 +7253,7 @@
             </p:txBody>
           </p:sp>
         </mc:Choice>
-        <mc:Fallback>
+        <mc:Fallback xmlns="">
           <p:sp>
             <p:nvSpPr>
               <p:cNvPr id="32" name="CuadroTexto 31">
@@ -7438,8 +7437,8 @@
           </a:fontRef>
         </p:style>
       </p:cxnSp>
-      <mc:AlternateContent xmlns:mc="http://schemas.openxmlformats.org/markup-compatibility/2006">
-        <mc:Choice xmlns:a14="http://schemas.microsoft.com/office/drawing/2010/main" Requires="a14">
+      <mc:AlternateContent xmlns:mc="http://schemas.openxmlformats.org/markup-compatibility/2006" xmlns:a14="http://schemas.microsoft.com/office/drawing/2010/main">
+        <mc:Choice Requires="a14">
           <p:sp>
             <p:nvSpPr>
               <p:cNvPr id="67" name="CuadroTexto 66">
@@ -7495,7 +7494,7 @@
             </p:txBody>
           </p:sp>
         </mc:Choice>
-        <mc:Fallback>
+        <mc:Fallback xmlns="">
           <p:sp>
             <p:nvSpPr>
               <p:cNvPr id="67" name="CuadroTexto 66">
@@ -7585,8 +7584,8 @@
           </a:fontRef>
         </p:style>
       </p:cxnSp>
-      <mc:AlternateContent xmlns:mc="http://schemas.openxmlformats.org/markup-compatibility/2006">
-        <mc:Choice xmlns:a14="http://schemas.microsoft.com/office/drawing/2010/main" Requires="a14">
+      <mc:AlternateContent xmlns:mc="http://schemas.openxmlformats.org/markup-compatibility/2006" xmlns:a14="http://schemas.microsoft.com/office/drawing/2010/main">
+        <mc:Choice Requires="a14">
           <p:sp>
             <p:nvSpPr>
               <p:cNvPr id="101" name="CuadroTexto 100">
@@ -7667,7 +7666,7 @@
             </p:txBody>
           </p:sp>
         </mc:Choice>
-        <mc:Fallback>
+        <mc:Fallback xmlns="">
           <p:sp>
             <p:nvSpPr>
               <p:cNvPr id="101" name="CuadroTexto 100">
@@ -7988,8 +7987,8 @@
           </a:p>
         </p:txBody>
       </p:sp>
-      <mc:AlternateContent xmlns:mc="http://schemas.openxmlformats.org/markup-compatibility/2006">
-        <mc:Choice xmlns:a14="http://schemas.microsoft.com/office/drawing/2010/main" Requires="a14">
+      <mc:AlternateContent xmlns:mc="http://schemas.openxmlformats.org/markup-compatibility/2006" xmlns:a14="http://schemas.microsoft.com/office/drawing/2010/main">
+        <mc:Choice Requires="a14">
           <p:sp>
             <p:nvSpPr>
               <p:cNvPr id="121" name="CuadroTexto 120">
@@ -8045,7 +8044,7 @@
             </p:txBody>
           </p:sp>
         </mc:Choice>
-        <mc:Fallback>
+        <mc:Fallback xmlns="">
           <p:sp>
             <p:nvSpPr>
               <p:cNvPr id="121" name="CuadroTexto 120">
@@ -8201,8 +8200,8 @@
           </a:p>
         </p:txBody>
       </p:sp>
-      <mc:AlternateContent xmlns:mc="http://schemas.openxmlformats.org/markup-compatibility/2006">
-        <mc:Choice xmlns:a14="http://schemas.microsoft.com/office/drawing/2010/main" Requires="a14">
+      <mc:AlternateContent xmlns:mc="http://schemas.openxmlformats.org/markup-compatibility/2006" xmlns:a14="http://schemas.microsoft.com/office/drawing/2010/main">
+        <mc:Choice Requires="a14">
           <p:sp>
             <p:nvSpPr>
               <p:cNvPr id="126" name="CuadroTexto 125">
@@ -8259,7 +8258,7 @@
             </p:txBody>
           </p:sp>
         </mc:Choice>
-        <mc:Fallback>
+        <mc:Fallback xmlns="">
           <p:sp>
             <p:nvSpPr>
               <p:cNvPr id="126" name="CuadroTexto 125">
@@ -8415,8 +8414,8 @@
           </a:p>
         </p:txBody>
       </p:sp>
-      <mc:AlternateContent xmlns:mc="http://schemas.openxmlformats.org/markup-compatibility/2006">
-        <mc:Choice xmlns:a14="http://schemas.microsoft.com/office/drawing/2010/main" Requires="a14">
+      <mc:AlternateContent xmlns:mc="http://schemas.openxmlformats.org/markup-compatibility/2006" xmlns:a14="http://schemas.microsoft.com/office/drawing/2010/main">
+        <mc:Choice Requires="a14">
           <p:sp>
             <p:nvSpPr>
               <p:cNvPr id="131" name="CuadroTexto 130">
@@ -8473,7 +8472,7 @@
             </p:txBody>
           </p:sp>
         </mc:Choice>
-        <mc:Fallback>
+        <mc:Fallback xmlns="">
           <p:sp>
             <p:nvSpPr>
               <p:cNvPr id="131" name="CuadroTexto 130">
@@ -8575,163 +8574,6 @@
           </a:p>
         </p:txBody>
       </p:sp>
-      <p:sp>
-        <p:nvSpPr>
-          <p:cNvPr id="137" name="Rectángulo 136">
-            <a:extLst>
-              <a:ext uri="{FF2B5EF4-FFF2-40B4-BE49-F238E27FC236}">
-                <a16:creationId xmlns:a16="http://schemas.microsoft.com/office/drawing/2014/main" id="{C83FC5DF-03E0-CA6B-316A-168851A2F211}"/>
-              </a:ext>
-            </a:extLst>
-          </p:cNvPr>
-          <p:cNvSpPr/>
-          <p:nvPr/>
-        </p:nvSpPr>
-        <p:spPr>
-          <a:xfrm>
-            <a:off x="9165015" y="2677074"/>
-            <a:ext cx="669508" cy="349096"/>
-          </a:xfrm>
-          <a:prstGeom prst="rect">
-            <a:avLst/>
-          </a:prstGeom>
-          <a:solidFill>
-            <a:srgbClr val="2FAE68"/>
-          </a:solidFill>
-          <a:ln>
-            <a:noFill/>
-          </a:ln>
-        </p:spPr>
-        <p:style>
-          <a:lnRef idx="1">
-            <a:schemeClr val="accent2"/>
-          </a:lnRef>
-          <a:fillRef idx="2">
-            <a:schemeClr val="accent2"/>
-          </a:fillRef>
-          <a:effectRef idx="1">
-            <a:schemeClr val="accent2"/>
-          </a:effectRef>
-          <a:fontRef idx="minor">
-            <a:schemeClr val="dk1"/>
-          </a:fontRef>
-        </p:style>
-        <p:txBody>
-          <a:bodyPr rtlCol="0" anchor="ctr"/>
-          <a:lstStyle/>
-          <a:p>
-            <a:pPr algn="ctr"/>
-            <a:endParaRPr lang="es-NL" sz="1400" dirty="0">
-              <a:latin typeface="DEJAVU SANS" panose="020B0603030804020204" pitchFamily="34" charset="0"/>
-              <a:ea typeface="DEJAVU SANS" panose="020B0603030804020204" pitchFamily="34" charset="0"/>
-              <a:cs typeface="DEJAVU SANS" panose="020B0603030804020204" pitchFamily="34" charset="0"/>
-            </a:endParaRPr>
-          </a:p>
-        </p:txBody>
-      </p:sp>
-      <mc:AlternateContent xmlns:mc="http://schemas.openxmlformats.org/markup-compatibility/2006">
-        <mc:Choice xmlns:a14="http://schemas.microsoft.com/office/drawing/2010/main" Requires="a14">
-          <p:sp>
-            <p:nvSpPr>
-              <p:cNvPr id="136" name="CuadroTexto 135">
-                <a:extLst>
-                  <a:ext uri="{FF2B5EF4-FFF2-40B4-BE49-F238E27FC236}">
-                    <a16:creationId xmlns:a16="http://schemas.microsoft.com/office/drawing/2014/main" id="{E15306AA-045A-F0A2-F5A9-D554E3AE7760}"/>
-                  </a:ext>
-                </a:extLst>
-              </p:cNvPr>
-              <p:cNvSpPr txBox="1"/>
-              <p:nvPr/>
-            </p:nvSpPr>
-            <p:spPr>
-              <a:xfrm>
-                <a:off x="9104052" y="2702415"/>
-                <a:ext cx="840230" cy="261610"/>
-              </a:xfrm>
-              <a:prstGeom prst="rect">
-                <a:avLst/>
-              </a:prstGeom>
-              <a:noFill/>
-            </p:spPr>
-            <p:txBody>
-              <a:bodyPr wrap="square" rtlCol="0">
-                <a:spAutoFit/>
-              </a:bodyPr>
-              <a:lstStyle/>
-              <a:p>
-                <a:r>
-                  <a:rPr lang="es-NL" sz="1100" dirty="0">
-                    <a:ea typeface="DEJAVU SANS" panose="020B0603030804020204" pitchFamily="34" charset="0"/>
-                    <a:cs typeface="DEJAVU SANS" panose="020B0603030804020204" pitchFamily="34" charset="0"/>
-                  </a:rPr>
-                  <a:t> Softmax</a:t>
-                </a:r>
-                <a14:m>
-                  <m:oMath xmlns:m="http://schemas.openxmlformats.org/officeDocument/2006/math">
-                    <m:r>
-                      <a:rPr lang="es-NL" sz="1100" i="1" dirty="0" smtClean="0">
-                        <a:latin typeface="DEJAVU SANS" panose="020B0603030804020204" pitchFamily="34" charset="0"/>
-                        <a:ea typeface="DEJAVU SANS" panose="020B0603030804020204" pitchFamily="34" charset="0"/>
-                        <a:cs typeface="DEJAVU SANS" panose="020B0603030804020204" pitchFamily="34" charset="0"/>
-                      </a:rPr>
-                      <m:t>⁡</m:t>
-                    </m:r>
-                  </m:oMath>
-                </a14:m>
-                <a:endParaRPr lang="es-NL" sz="1100" dirty="0">
-                  <a:latin typeface="DEJAVU SANS" panose="020B0603030804020204" pitchFamily="34" charset="0"/>
-                  <a:ea typeface="DEJAVU SANS" panose="020B0603030804020204" pitchFamily="34" charset="0"/>
-                  <a:cs typeface="DEJAVU SANS" panose="020B0603030804020204" pitchFamily="34" charset="0"/>
-                </a:endParaRPr>
-              </a:p>
-            </p:txBody>
-          </p:sp>
-        </mc:Choice>
-        <mc:Fallback>
-          <p:sp>
-            <p:nvSpPr>
-              <p:cNvPr id="136" name="CuadroTexto 135">
-                <a:extLst>
-                  <a:ext uri="{FF2B5EF4-FFF2-40B4-BE49-F238E27FC236}">
-                    <a16:creationId xmlns:a16="http://schemas.microsoft.com/office/drawing/2014/main" id="{E15306AA-045A-F0A2-F5A9-D554E3AE7760}"/>
-                  </a:ext>
-                </a:extLst>
-              </p:cNvPr>
-              <p:cNvSpPr txBox="1">
-                <a:spLocks noRot="1" noChangeAspect="1" noMove="1" noResize="1" noEditPoints="1" noAdjustHandles="1" noChangeArrowheads="1" noChangeShapeType="1" noTextEdit="1"/>
-              </p:cNvSpPr>
-              <p:nvPr/>
-            </p:nvSpPr>
-            <p:spPr>
-              <a:xfrm>
-                <a:off x="9104052" y="2702415"/>
-                <a:ext cx="840230" cy="261610"/>
-              </a:xfrm>
-              <a:prstGeom prst="rect">
-                <a:avLst/>
-              </a:prstGeom>
-              <a:blipFill>
-                <a:blip r:embed="rId12"/>
-                <a:stretch>
-                  <a:fillRect b="-13636"/>
-                </a:stretch>
-              </a:blipFill>
-            </p:spPr>
-            <p:txBody>
-              <a:bodyPr/>
-              <a:lstStyle/>
-              <a:p>
-                <a:r>
-                  <a:rPr lang="es-NL">
-                    <a:noFill/>
-                  </a:rPr>
-                  <a:t> </a:t>
-                </a:r>
-              </a:p>
-            </p:txBody>
-          </p:sp>
-        </mc:Fallback>
-      </mc:AlternateContent>
       <p:cxnSp>
         <p:nvCxnSpPr>
           <p:cNvPr id="99" name="Conector recto de flecha 98">
@@ -8820,8 +8662,8 @@
           </a:fontRef>
         </p:style>
       </p:cxnSp>
-      <mc:AlternateContent xmlns:mc="http://schemas.openxmlformats.org/markup-compatibility/2006">
-        <mc:Choice xmlns:a14="http://schemas.microsoft.com/office/drawing/2010/main" Requires="a14">
+      <mc:AlternateContent xmlns:mc="http://schemas.openxmlformats.org/markup-compatibility/2006" xmlns:a14="http://schemas.microsoft.com/office/drawing/2010/main">
+        <mc:Choice Requires="a14">
           <p:sp>
             <p:nvSpPr>
               <p:cNvPr id="35" name="Rectángulo 34">
@@ -8994,7 +8836,7 @@
                               <a:ea typeface="DEJAVU SANS" panose="020B0603030804020204" pitchFamily="34" charset="0"/>
                               <a:cs typeface="DEJAVU SANS" panose="020B0603030804020204" pitchFamily="34" charset="0"/>
                             </a:rPr>
-                            <m:t>𝑘</m:t>
+                            <m:t>𝑛</m:t>
                           </m:r>
                         </m:sup>
                       </m:sSup>
@@ -9088,7 +8930,7 @@
             </p:txBody>
           </p:sp>
         </mc:Choice>
-        <mc:Fallback>
+        <mc:Fallback xmlns="">
           <p:sp>
             <p:nvSpPr>
               <p:cNvPr id="35" name="Rectángulo 34">
@@ -9150,7 +8992,7 @@
         </p:nvSpPr>
         <p:spPr>
           <a:xfrm>
-            <a:off x="9925297" y="2715036"/>
+            <a:off x="9145309" y="2714933"/>
             <a:ext cx="808235" cy="261610"/>
           </a:xfrm>
           <a:prstGeom prst="rect">
@@ -9219,8 +9061,8 @@
           </a:fontRef>
         </p:style>
       </p:cxnSp>
-      <mc:AlternateContent xmlns:mc="http://schemas.openxmlformats.org/markup-compatibility/2006">
-        <mc:Choice xmlns:a14="http://schemas.microsoft.com/office/drawing/2010/main" Requires="a14">
+      <mc:AlternateContent xmlns:mc="http://schemas.openxmlformats.org/markup-compatibility/2006" xmlns:a14="http://schemas.microsoft.com/office/drawing/2010/main">
+        <mc:Choice Requires="a14">
           <p:sp>
             <p:nvSpPr>
               <p:cNvPr id="144" name="CuadroTexto 143">
@@ -9278,7 +9120,7 @@
             </p:txBody>
           </p:sp>
         </mc:Choice>
-        <mc:Fallback>
+        <mc:Fallback xmlns="">
           <p:sp>
             <p:nvSpPr>
               <p:cNvPr id="144" name="CuadroTexto 143">
@@ -9779,8 +9621,8 @@
           </a:fontRef>
         </p:style>
       </p:cxnSp>
-      <mc:AlternateContent xmlns:mc="http://schemas.openxmlformats.org/markup-compatibility/2006">
-        <mc:Choice xmlns:a14="http://schemas.microsoft.com/office/drawing/2010/main" Requires="a14">
+      <mc:AlternateContent xmlns:mc="http://schemas.openxmlformats.org/markup-compatibility/2006" xmlns:a14="http://schemas.microsoft.com/office/drawing/2010/main">
+        <mc:Choice Requires="a14">
           <p:sp>
             <p:nvSpPr>
               <p:cNvPr id="110" name="Rectángulo 109">
@@ -9953,7 +9795,7 @@
                               <a:ea typeface="DEJAVU SANS" panose="020B0603030804020204" pitchFamily="34" charset="0"/>
                               <a:cs typeface="DEJAVU SANS" panose="020B0603030804020204" pitchFamily="34" charset="0"/>
                             </a:rPr>
-                            <m:t>𝑘</m:t>
+                            <m:t>𝑛</m:t>
                           </m:r>
                         </m:sup>
                       </m:sSup>
@@ -10047,7 +9889,7 @@
             </p:txBody>
           </p:sp>
         </mc:Choice>
-        <mc:Fallback>
+        <mc:Fallback xmlns="">
           <p:sp>
             <p:nvSpPr>
               <p:cNvPr id="110" name="Rectángulo 109">

</xml_diff>